<commit_message>
Added the ability to add audio tours. A new table has been created in the database, and a script for adding an audio tour has been created in the script.
</commit_message>
<xml_diff>
--- a/presentation.pptx
+++ b/presentation.pptx
@@ -114,6 +114,11 @@
       </a:defRPr>
     </a:lvl9pPr>
   </p:defaultTextStyle>
+  <p:extLst>
+    <p:ext uri="{EFAFB233-063F-42B5-8137-9DF3F51BA10A}">
+      <p15:sldGuideLst xmlns:p15="http://schemas.microsoft.com/office/powerpoint/2012/main"/>
+    </p:ext>
+  </p:extLst>
 </p:presentation>
 </file>
 
@@ -199,7 +204,7 @@
           <a:p>
             <a:fld id="{EFD8F493-7405-4C36-AC30-86784F8B8D61}" type="datetimeFigureOut">
               <a:rPr lang="ru-RU" smtClean="0"/>
-              <a:t>21.04.2019</a:t>
+              <a:t>07.05.2019</a:t>
             </a:fld>
             <a:endParaRPr lang="ru-RU"/>
           </a:p>
@@ -562,7 +567,31 @@
                 <a:ea typeface="+mn-ea"/>
                 <a:cs typeface="+mn-cs"/>
               </a:rPr>
-              <a:t> - это лучший навык для экскурсоводов и путешественников. Здесь каждый может добавить экскурсию, если вдруг у него появится желание провести экскурсию и рассказать другим людям, например, о достопримечательностях своего города. Другие же могут увидеть все экскурсии, которые были добавлены в навык, на карте. А по номеру экскурсии могут получить всю информацию об этой экскурсии, которую указывал экскурсовод: адрес проведения, дата проведения, стоимость, описание экскурсии, ФИО экскурсовода, номер телефона экскурсовода и т.д. Активационное имя для навыка: "Запусти навык </a:t>
+              <a:t> – это</a:t>
+            </a:r>
+            <a:r>
+              <a:rPr lang="ru-RU" sz="1200" kern="1200" baseline="0" dirty="0" smtClean="0">
+                <a:solidFill>
+                  <a:schemeClr val="tx1"/>
+                </a:solidFill>
+                <a:effectLst/>
+                <a:latin typeface="+mn-lt"/>
+                <a:ea typeface="+mn-ea"/>
+                <a:cs typeface="+mn-cs"/>
+              </a:rPr>
+              <a:t> </a:t>
+            </a:r>
+            <a:r>
+              <a:rPr lang="ru-RU" sz="1200" kern="1200" dirty="0" smtClean="0">
+                <a:solidFill>
+                  <a:schemeClr val="tx1"/>
+                </a:solidFill>
+                <a:effectLst/>
+                <a:latin typeface="+mn-lt"/>
+                <a:ea typeface="+mn-ea"/>
+                <a:cs typeface="+mn-cs"/>
+              </a:rPr>
+              <a:t>навык для экскурсоводов и путешественников. Здесь каждый может добавить экскурсию, если вдруг у него появится желание провести экскурсию и рассказать другим людям, например, о достопримечательностях своего города. Другие же могут увидеть все экскурсии, которые были добавлены в навык, на карте. А по номеру экскурсии могут получить всю информацию об этой экскурсии, которую указывал экскурсовод: адрес проведения, дата проведения, стоимость, описание экскурсии, ФИО экскурсовода, номер телефона экскурсовода и т.д. Активационное имя для навыка: "Запусти навык </a:t>
             </a:r>
             <a:r>
               <a:rPr lang="ru-RU" sz="1200" kern="1200" dirty="0" err="1" smtClean="0">
@@ -685,8 +714,11 @@
                 <a:ea typeface="+mn-ea"/>
                 <a:cs typeface="+mn-cs"/>
               </a:rPr>
-              <a:t>1) </a:t>
-            </a:r>
+              <a:t>1) (анимация) Показать все экскурсии – будет показана карта с метками экскурсий в городах</a:t>
+            </a:r>
+          </a:p>
+          <a:p>
+            <a:pPr lvl="0"/>
             <a:r>
               <a:rPr lang="ru-RU" sz="1200" kern="1200" dirty="0" smtClean="0">
                 <a:solidFill>
@@ -697,8 +729,11 @@
                 <a:ea typeface="+mn-ea"/>
                 <a:cs typeface="+mn-cs"/>
               </a:rPr>
-              <a:t>(анимация) </a:t>
-            </a:r>
+              <a:t>2) (анимация) Добавить экскурсию</a:t>
+            </a:r>
+          </a:p>
+          <a:p>
+            <a:pPr lvl="0"/>
             <a:r>
               <a:rPr lang="ru-RU" sz="1200" kern="1200" dirty="0" smtClean="0">
                 <a:solidFill>
@@ -709,7 +744,7 @@
                 <a:ea typeface="+mn-ea"/>
                 <a:cs typeface="+mn-cs"/>
               </a:rPr>
-              <a:t>Показать все экскурсии – будет показана карта с метками экскурсий в городах</a:t>
+              <a:t>3) (анимация) Города, в которых есть экскурсии</a:t>
             </a:r>
           </a:p>
           <a:p>
@@ -724,8 +759,10 @@
                 <a:ea typeface="+mn-ea"/>
                 <a:cs typeface="+mn-cs"/>
               </a:rPr>
-              <a:t>2) </a:t>
-            </a:r>
+              <a:t>4) (анимация) Показать экскурсии в каком-либо городе – будет показана карта с метками, на которых будут номера экскурсий в данном городе</a:t>
+            </a:r>
+          </a:p>
+          <a:p>
             <a:r>
               <a:rPr lang="ru-RU" sz="1200" kern="1200" dirty="0" smtClean="0">
                 <a:solidFill>
@@ -736,8 +773,10 @@
                 <a:ea typeface="+mn-ea"/>
                 <a:cs typeface="+mn-cs"/>
               </a:rPr>
-              <a:t>(анимация) </a:t>
-            </a:r>
+              <a:t> </a:t>
+            </a:r>
+          </a:p>
+          <a:p>
             <a:r>
               <a:rPr lang="ru-RU" sz="1200" kern="1200" dirty="0" smtClean="0">
                 <a:solidFill>
@@ -748,11 +787,10 @@
                 <a:ea typeface="+mn-ea"/>
                 <a:cs typeface="+mn-cs"/>
               </a:rPr>
-              <a:t>Добавить экскурсию</a:t>
-            </a:r>
-          </a:p>
-          <a:p>
-            <a:pPr lvl="0"/>
+              <a:t>После показа экскурсий в каком-то городе, у каждой экскурсии будет свой номер в этом городе. По этому номеру можно выполнить следующие команды:</a:t>
+            </a:r>
+          </a:p>
+          <a:p>
             <a:r>
               <a:rPr lang="ru-RU" sz="1200" kern="1200" dirty="0" smtClean="0">
                 <a:solidFill>
@@ -763,8 +801,10 @@
                 <a:ea typeface="+mn-ea"/>
                 <a:cs typeface="+mn-cs"/>
               </a:rPr>
-              <a:t>3) </a:t>
-            </a:r>
+              <a:t> </a:t>
+            </a:r>
+          </a:p>
+          <a:p>
             <a:r>
               <a:rPr lang="ru-RU" sz="1200" kern="1200" dirty="0" smtClean="0">
                 <a:solidFill>
@@ -775,8 +815,10 @@
                 <a:ea typeface="+mn-ea"/>
                 <a:cs typeface="+mn-cs"/>
               </a:rPr>
-              <a:t>(анимация) </a:t>
-            </a:r>
+              <a:t>1) (анимация) Показать экскурсию номер &lt;номер экскурсии&gt; - будет показана информация об экскурсии</a:t>
+            </a:r>
+          </a:p>
+          <a:p>
             <a:r>
               <a:rPr lang="ru-RU" sz="1200" kern="1200" dirty="0" smtClean="0">
                 <a:solidFill>
@@ -787,11 +829,10 @@
                 <a:ea typeface="+mn-ea"/>
                 <a:cs typeface="+mn-cs"/>
               </a:rPr>
-              <a:t>Города, в которых есть экскурсии</a:t>
-            </a:r>
-          </a:p>
-          <a:p>
-            <a:pPr lvl="0"/>
+              <a:t>2) (анимация) Удалить экскурсию номер &lt;номер экскурсии&gt; - будет вызвана команда удаления экскурсии, но для этого нужно ввести пароль, который указывается при добавлении</a:t>
+            </a:r>
+          </a:p>
+          <a:p>
             <a:r>
               <a:rPr lang="ru-RU" sz="1200" kern="1200" dirty="0" smtClean="0">
                 <a:solidFill>
@@ -802,187 +843,7 @@
                 <a:ea typeface="+mn-ea"/>
                 <a:cs typeface="+mn-cs"/>
               </a:rPr>
-              <a:t>4) </a:t>
-            </a:r>
-            <a:r>
-              <a:rPr lang="ru-RU" sz="1200" kern="1200" dirty="0" smtClean="0">
-                <a:solidFill>
-                  <a:schemeClr val="tx1"/>
-                </a:solidFill>
-                <a:effectLst/>
-                <a:latin typeface="+mn-lt"/>
-                <a:ea typeface="+mn-ea"/>
-                <a:cs typeface="+mn-cs"/>
-              </a:rPr>
-              <a:t>(анимация) </a:t>
-            </a:r>
-            <a:r>
-              <a:rPr lang="ru-RU" sz="1200" kern="1200" dirty="0" smtClean="0">
-                <a:solidFill>
-                  <a:schemeClr val="tx1"/>
-                </a:solidFill>
-                <a:effectLst/>
-                <a:latin typeface="+mn-lt"/>
-                <a:ea typeface="+mn-ea"/>
-                <a:cs typeface="+mn-cs"/>
-              </a:rPr>
-              <a:t>Показать экскурсии в каком-либо городе – будет показана карта с метками, на которых будут номера экскурсий в данном городе</a:t>
-            </a:r>
-          </a:p>
-          <a:p>
-            <a:r>
-              <a:rPr lang="ru-RU" sz="1200" kern="1200" dirty="0" smtClean="0">
-                <a:solidFill>
-                  <a:schemeClr val="tx1"/>
-                </a:solidFill>
-                <a:effectLst/>
-                <a:latin typeface="+mn-lt"/>
-                <a:ea typeface="+mn-ea"/>
-                <a:cs typeface="+mn-cs"/>
-              </a:rPr>
-              <a:t> </a:t>
-            </a:r>
-          </a:p>
-          <a:p>
-            <a:r>
-              <a:rPr lang="ru-RU" sz="1200" kern="1200" dirty="0" smtClean="0">
-                <a:solidFill>
-                  <a:schemeClr val="tx1"/>
-                </a:solidFill>
-                <a:effectLst/>
-                <a:latin typeface="+mn-lt"/>
-                <a:ea typeface="+mn-ea"/>
-                <a:cs typeface="+mn-cs"/>
-              </a:rPr>
-              <a:t>После показа экскурсий в каком-то городе, у каждой экскурсии будет свой номер в этом городе. По этому номеру можно выполнить следующие команды:</a:t>
-            </a:r>
-          </a:p>
-          <a:p>
-            <a:r>
-              <a:rPr lang="ru-RU" sz="1200" kern="1200" dirty="0" smtClean="0">
-                <a:solidFill>
-                  <a:schemeClr val="tx1"/>
-                </a:solidFill>
-                <a:effectLst/>
-                <a:latin typeface="+mn-lt"/>
-                <a:ea typeface="+mn-ea"/>
-                <a:cs typeface="+mn-cs"/>
-              </a:rPr>
-              <a:t> </a:t>
-            </a:r>
-          </a:p>
-          <a:p>
-            <a:r>
-              <a:rPr lang="ru-RU" sz="1200" kern="1200" dirty="0" smtClean="0">
-                <a:solidFill>
-                  <a:schemeClr val="tx1"/>
-                </a:solidFill>
-                <a:effectLst/>
-                <a:latin typeface="+mn-lt"/>
-                <a:ea typeface="+mn-ea"/>
-                <a:cs typeface="+mn-cs"/>
-              </a:rPr>
-              <a:t>1) </a:t>
-            </a:r>
-            <a:r>
-              <a:rPr lang="ru-RU" sz="1200" kern="1200" dirty="0" smtClean="0">
-                <a:solidFill>
-                  <a:schemeClr val="tx1"/>
-                </a:solidFill>
-                <a:effectLst/>
-                <a:latin typeface="+mn-lt"/>
-                <a:ea typeface="+mn-ea"/>
-                <a:cs typeface="+mn-cs"/>
-              </a:rPr>
-              <a:t>(анимация) </a:t>
-            </a:r>
-            <a:r>
-              <a:rPr lang="ru-RU" sz="1200" kern="1200" dirty="0" smtClean="0">
-                <a:solidFill>
-                  <a:schemeClr val="tx1"/>
-                </a:solidFill>
-                <a:effectLst/>
-                <a:latin typeface="+mn-lt"/>
-                <a:ea typeface="+mn-ea"/>
-                <a:cs typeface="+mn-cs"/>
-              </a:rPr>
-              <a:t>Показать экскурсию номер &lt;номер экскурсии&gt; - будет показана информация об экскурсии</a:t>
-            </a:r>
-          </a:p>
-          <a:p>
-            <a:r>
-              <a:rPr lang="ru-RU" sz="1200" kern="1200" dirty="0" smtClean="0">
-                <a:solidFill>
-                  <a:schemeClr val="tx1"/>
-                </a:solidFill>
-                <a:effectLst/>
-                <a:latin typeface="+mn-lt"/>
-                <a:ea typeface="+mn-ea"/>
-                <a:cs typeface="+mn-cs"/>
-              </a:rPr>
-              <a:t>2) </a:t>
-            </a:r>
-            <a:r>
-              <a:rPr lang="ru-RU" sz="1200" kern="1200" dirty="0" smtClean="0">
-                <a:solidFill>
-                  <a:schemeClr val="tx1"/>
-                </a:solidFill>
-                <a:effectLst/>
-                <a:latin typeface="+mn-lt"/>
-                <a:ea typeface="+mn-ea"/>
-                <a:cs typeface="+mn-cs"/>
-              </a:rPr>
-              <a:t>(анимация) </a:t>
-            </a:r>
-            <a:r>
-              <a:rPr lang="ru-RU" sz="1200" kern="1200" dirty="0" smtClean="0">
-                <a:solidFill>
-                  <a:schemeClr val="tx1"/>
-                </a:solidFill>
-                <a:effectLst/>
-                <a:latin typeface="+mn-lt"/>
-                <a:ea typeface="+mn-ea"/>
-                <a:cs typeface="+mn-cs"/>
-              </a:rPr>
-              <a:t>Удалить экскурсию номер &lt;номер экскурсии&gt; - будет вызвана команда удаления экскурсии, но для этого нужно ввести пароль, который указывается при добавлении</a:t>
-            </a:r>
-          </a:p>
-          <a:p>
-            <a:r>
-              <a:rPr lang="ru-RU" sz="1200" kern="1200" dirty="0" smtClean="0">
-                <a:solidFill>
-                  <a:schemeClr val="tx1"/>
-                </a:solidFill>
-                <a:effectLst/>
-                <a:latin typeface="+mn-lt"/>
-                <a:ea typeface="+mn-ea"/>
-                <a:cs typeface="+mn-cs"/>
-              </a:rPr>
-              <a:t>3) </a:t>
-            </a:r>
-            <a:r>
-              <a:rPr lang="ru-RU" sz="1200" kern="1200" dirty="0" smtClean="0">
-                <a:solidFill>
-                  <a:schemeClr val="tx1"/>
-                </a:solidFill>
-                <a:effectLst/>
-                <a:latin typeface="+mn-lt"/>
-                <a:ea typeface="+mn-ea"/>
-                <a:cs typeface="+mn-cs"/>
-              </a:rPr>
-              <a:t>(анимация) </a:t>
-            </a:r>
-            <a:r>
-              <a:rPr lang="ru-RU" sz="1200" kern="1200" dirty="0" smtClean="0">
-                <a:solidFill>
-                  <a:schemeClr val="tx1"/>
-                </a:solidFill>
-                <a:effectLst/>
-                <a:latin typeface="+mn-lt"/>
-                <a:ea typeface="+mn-ea"/>
-                <a:cs typeface="+mn-cs"/>
-              </a:rPr>
-              <a:t>Редактировать экскурсию номер &lt;номер экскурсии&gt; - можно отредактировать все поля экскурсии. Но опять же нужно указать пароль</a:t>
+              <a:t>3) (анимация) Редактировать экскурсию номер &lt;номер экскурсии&gt; - можно отредактировать все поля экскурсии. Но опять же нужно указать пароль</a:t>
             </a:r>
           </a:p>
           <a:p>
@@ -1119,8 +980,11 @@
                 <a:ea typeface="+mn-ea"/>
                 <a:cs typeface="+mn-cs"/>
               </a:rPr>
-              <a:t>(анимация) </a:t>
-            </a:r>
+              <a:t>(анимация) Дата проведения экскурсии</a:t>
+            </a:r>
+          </a:p>
+          <a:p>
+            <a:pPr lvl="0"/>
             <a:r>
               <a:rPr lang="ru-RU" sz="1200" kern="1200" dirty="0" smtClean="0">
                 <a:solidFill>
@@ -1131,7 +995,7 @@
                 <a:ea typeface="+mn-ea"/>
                 <a:cs typeface="+mn-cs"/>
               </a:rPr>
-              <a:t>Дата проведения экскурсии</a:t>
+              <a:t>(анимация) Пароль для удаления и редактирования экскурсии</a:t>
             </a:r>
           </a:p>
           <a:p>
@@ -1146,8 +1010,11 @@
                 <a:ea typeface="+mn-ea"/>
                 <a:cs typeface="+mn-cs"/>
               </a:rPr>
-              <a:t>(анимация) </a:t>
-            </a:r>
+              <a:t>(анимация) ФИО экскурсовода</a:t>
+            </a:r>
+          </a:p>
+          <a:p>
+            <a:pPr lvl="0"/>
             <a:r>
               <a:rPr lang="ru-RU" sz="1200" kern="1200" dirty="0" smtClean="0">
                 <a:solidFill>
@@ -1158,7 +1025,7 @@
                 <a:ea typeface="+mn-ea"/>
                 <a:cs typeface="+mn-cs"/>
               </a:rPr>
-              <a:t>Пароль для удаления и редактирования экскурсии</a:t>
+              <a:t>(анимация) Название экскурсии</a:t>
             </a:r>
           </a:p>
           <a:p>
@@ -1173,8 +1040,11 @@
                 <a:ea typeface="+mn-ea"/>
                 <a:cs typeface="+mn-cs"/>
               </a:rPr>
-              <a:t>(анимация) </a:t>
-            </a:r>
+              <a:t>(анимация) Краткая информация об экскурсии</a:t>
+            </a:r>
+          </a:p>
+          <a:p>
+            <a:pPr lvl="0"/>
             <a:r>
               <a:rPr lang="ru-RU" sz="1200" kern="1200" dirty="0" smtClean="0">
                 <a:solidFill>
@@ -1185,7 +1055,7 @@
                 <a:ea typeface="+mn-ea"/>
                 <a:cs typeface="+mn-cs"/>
               </a:rPr>
-              <a:t>ФИО экскурсовода</a:t>
+              <a:t>(анимация) Средняя продолжительность экскурсии</a:t>
             </a:r>
           </a:p>
           <a:p>
@@ -1200,8 +1070,11 @@
                 <a:ea typeface="+mn-ea"/>
                 <a:cs typeface="+mn-cs"/>
               </a:rPr>
-              <a:t>(анимация) </a:t>
-            </a:r>
+              <a:t>(анимация) Описание места встречи, чтобы было удобнее его найти</a:t>
+            </a:r>
+          </a:p>
+          <a:p>
+            <a:pPr lvl="0"/>
             <a:r>
               <a:rPr lang="ru-RU" sz="1200" kern="1200" dirty="0" smtClean="0">
                 <a:solidFill>
@@ -1212,115 +1085,7 @@
                 <a:ea typeface="+mn-ea"/>
                 <a:cs typeface="+mn-cs"/>
               </a:rPr>
-              <a:t>Название экскурсии</a:t>
-            </a:r>
-          </a:p>
-          <a:p>
-            <a:pPr lvl="0"/>
-            <a:r>
-              <a:rPr lang="ru-RU" sz="1200" kern="1200" dirty="0" smtClean="0">
-                <a:solidFill>
-                  <a:schemeClr val="tx1"/>
-                </a:solidFill>
-                <a:effectLst/>
-                <a:latin typeface="+mn-lt"/>
-                <a:ea typeface="+mn-ea"/>
-                <a:cs typeface="+mn-cs"/>
-              </a:rPr>
-              <a:t>(анимация) </a:t>
-            </a:r>
-            <a:r>
-              <a:rPr lang="ru-RU" sz="1200" kern="1200" dirty="0" smtClean="0">
-                <a:solidFill>
-                  <a:schemeClr val="tx1"/>
-                </a:solidFill>
-                <a:effectLst/>
-                <a:latin typeface="+mn-lt"/>
-                <a:ea typeface="+mn-ea"/>
-                <a:cs typeface="+mn-cs"/>
-              </a:rPr>
-              <a:t>Краткая информация об экскурсии</a:t>
-            </a:r>
-          </a:p>
-          <a:p>
-            <a:pPr lvl="0"/>
-            <a:r>
-              <a:rPr lang="ru-RU" sz="1200" kern="1200" dirty="0" smtClean="0">
-                <a:solidFill>
-                  <a:schemeClr val="tx1"/>
-                </a:solidFill>
-                <a:effectLst/>
-                <a:latin typeface="+mn-lt"/>
-                <a:ea typeface="+mn-ea"/>
-                <a:cs typeface="+mn-cs"/>
-              </a:rPr>
-              <a:t>(анимация) </a:t>
-            </a:r>
-            <a:r>
-              <a:rPr lang="ru-RU" sz="1200" kern="1200" dirty="0" smtClean="0">
-                <a:solidFill>
-                  <a:schemeClr val="tx1"/>
-                </a:solidFill>
-                <a:effectLst/>
-                <a:latin typeface="+mn-lt"/>
-                <a:ea typeface="+mn-ea"/>
-                <a:cs typeface="+mn-cs"/>
-              </a:rPr>
-              <a:t>Средняя продолжительность экскурсии</a:t>
-            </a:r>
-          </a:p>
-          <a:p>
-            <a:pPr lvl="0"/>
-            <a:r>
-              <a:rPr lang="ru-RU" sz="1200" kern="1200" dirty="0" smtClean="0">
-                <a:solidFill>
-                  <a:schemeClr val="tx1"/>
-                </a:solidFill>
-                <a:effectLst/>
-                <a:latin typeface="+mn-lt"/>
-                <a:ea typeface="+mn-ea"/>
-                <a:cs typeface="+mn-cs"/>
-              </a:rPr>
-              <a:t>(анимация) </a:t>
-            </a:r>
-            <a:r>
-              <a:rPr lang="ru-RU" sz="1200" kern="1200" dirty="0" smtClean="0">
-                <a:solidFill>
-                  <a:schemeClr val="tx1"/>
-                </a:solidFill>
-                <a:effectLst/>
-                <a:latin typeface="+mn-lt"/>
-                <a:ea typeface="+mn-ea"/>
-                <a:cs typeface="+mn-cs"/>
-              </a:rPr>
-              <a:t>Описание места встречи, чтобы было удобнее его найти</a:t>
-            </a:r>
-          </a:p>
-          <a:p>
-            <a:pPr lvl="0"/>
-            <a:r>
-              <a:rPr lang="ru-RU" sz="1200" kern="1200" dirty="0" smtClean="0">
-                <a:solidFill>
-                  <a:schemeClr val="tx1"/>
-                </a:solidFill>
-                <a:effectLst/>
-                <a:latin typeface="+mn-lt"/>
-                <a:ea typeface="+mn-ea"/>
-                <a:cs typeface="+mn-cs"/>
-              </a:rPr>
-              <a:t>(анимация) </a:t>
-            </a:r>
-            <a:r>
-              <a:rPr lang="ru-RU" sz="1200" kern="1200" dirty="0" smtClean="0">
-                <a:solidFill>
-                  <a:schemeClr val="tx1"/>
-                </a:solidFill>
-                <a:effectLst/>
-                <a:latin typeface="+mn-lt"/>
-                <a:ea typeface="+mn-ea"/>
-                <a:cs typeface="+mn-cs"/>
-              </a:rPr>
-              <a:t>Телефон экскурсовода</a:t>
+              <a:t>(анимация) Телефон экскурсовода</a:t>
             </a:r>
           </a:p>
           <a:p>
@@ -1490,8 +1255,11 @@
                 <a:ea typeface="+mn-ea"/>
                 <a:cs typeface="+mn-cs"/>
               </a:rPr>
-              <a:t>(анимация) </a:t>
-            </a:r>
+              <a:t>(анимация) Название экскурсии</a:t>
+            </a:r>
+          </a:p>
+          <a:p>
+            <a:pPr lvl="0"/>
             <a:r>
               <a:rPr lang="ru-RU" sz="1200" kern="1200" dirty="0" smtClean="0">
                 <a:solidFill>
@@ -1502,34 +1270,7 @@
                 <a:ea typeface="+mn-ea"/>
                 <a:cs typeface="+mn-cs"/>
               </a:rPr>
-              <a:t>Название экскурсии</a:t>
-            </a:r>
-          </a:p>
-          <a:p>
-            <a:pPr lvl="0"/>
-            <a:r>
-              <a:rPr lang="ru-RU" sz="1200" kern="1200" dirty="0" smtClean="0">
-                <a:solidFill>
-                  <a:schemeClr val="tx1"/>
-                </a:solidFill>
-                <a:effectLst/>
-                <a:latin typeface="+mn-lt"/>
-                <a:ea typeface="+mn-ea"/>
-                <a:cs typeface="+mn-cs"/>
-              </a:rPr>
-              <a:t>(анимация) </a:t>
-            </a:r>
-            <a:r>
-              <a:rPr lang="ru-RU" sz="1200" kern="1200" dirty="0" smtClean="0">
-                <a:solidFill>
-                  <a:schemeClr val="tx1"/>
-                </a:solidFill>
-                <a:effectLst/>
-                <a:latin typeface="+mn-lt"/>
-                <a:ea typeface="+mn-ea"/>
-                <a:cs typeface="+mn-cs"/>
-              </a:rPr>
-              <a:t>Место проведения, а точнее место</a:t>
+              <a:t>(анимация) Место проведения, а точнее место</a:t>
             </a:r>
             <a:r>
               <a:rPr lang="ru-RU" sz="1200" kern="1200" baseline="0" dirty="0" smtClean="0">
@@ -1604,19 +1345,7 @@
                 <a:ea typeface="+mn-ea"/>
                 <a:cs typeface="+mn-cs"/>
               </a:rPr>
-              <a:t>(анимация) </a:t>
-            </a:r>
-            <a:r>
-              <a:rPr lang="ru-RU" sz="1200" kern="1200" dirty="0" smtClean="0">
-                <a:solidFill>
-                  <a:schemeClr val="tx1"/>
-                </a:solidFill>
-                <a:effectLst/>
-                <a:latin typeface="+mn-lt"/>
-                <a:ea typeface="+mn-ea"/>
-                <a:cs typeface="+mn-cs"/>
-              </a:rPr>
-              <a:t>Конкретное описание места встречи, чтобы пользователям</a:t>
+              <a:t>(анимация) Конкретное описание места встречи, чтобы пользователям</a:t>
             </a:r>
             <a:r>
               <a:rPr lang="ru-RU" sz="1200" kern="1200" baseline="0" dirty="0" smtClean="0">
@@ -1652,8 +1381,11 @@
                 <a:ea typeface="+mn-ea"/>
                 <a:cs typeface="+mn-cs"/>
               </a:rPr>
-              <a:t>(анимация) </a:t>
-            </a:r>
+              <a:t>(анимация) ФИО экскурсовода</a:t>
+            </a:r>
+          </a:p>
+          <a:p>
+            <a:pPr lvl="0"/>
             <a:r>
               <a:rPr lang="ru-RU" sz="1200" kern="1200" dirty="0" smtClean="0">
                 <a:solidFill>
@@ -1664,34 +1396,7 @@
                 <a:ea typeface="+mn-ea"/>
                 <a:cs typeface="+mn-cs"/>
               </a:rPr>
-              <a:t>ФИО экскурсовода</a:t>
-            </a:r>
-          </a:p>
-          <a:p>
-            <a:pPr lvl="0"/>
-            <a:r>
-              <a:rPr lang="ru-RU" sz="1200" kern="1200" dirty="0" smtClean="0">
-                <a:solidFill>
-                  <a:schemeClr val="tx1"/>
-                </a:solidFill>
-                <a:effectLst/>
-                <a:latin typeface="+mn-lt"/>
-                <a:ea typeface="+mn-ea"/>
-                <a:cs typeface="+mn-cs"/>
-              </a:rPr>
-              <a:t>(анимация) </a:t>
-            </a:r>
-            <a:r>
-              <a:rPr lang="ru-RU" sz="1200" kern="1200" dirty="0" smtClean="0">
-                <a:solidFill>
-                  <a:schemeClr val="tx1"/>
-                </a:solidFill>
-                <a:effectLst/>
-                <a:latin typeface="+mn-lt"/>
-                <a:ea typeface="+mn-ea"/>
-                <a:cs typeface="+mn-cs"/>
-              </a:rPr>
-              <a:t>Описание экскурсии – какие места будут посещены,</a:t>
+              <a:t>(анимация) Описание экскурсии – какие места будут посещены,</a:t>
             </a:r>
             <a:r>
               <a:rPr lang="ru-RU" sz="1200" kern="1200" baseline="0" dirty="0" smtClean="0">
@@ -1727,8 +1432,11 @@
                 <a:ea typeface="+mn-ea"/>
                 <a:cs typeface="+mn-cs"/>
               </a:rPr>
-              <a:t>(анимация) </a:t>
-            </a:r>
+              <a:t>(анимация) Средняя продолжительность экскурсии</a:t>
+            </a:r>
+          </a:p>
+          <a:p>
+            <a:pPr lvl="0"/>
             <a:r>
               <a:rPr lang="ru-RU" sz="1200" kern="1200" dirty="0" smtClean="0">
                 <a:solidFill>
@@ -1739,7 +1447,7 @@
                 <a:ea typeface="+mn-ea"/>
                 <a:cs typeface="+mn-cs"/>
               </a:rPr>
-              <a:t>Средняя продолжительность экскурсии</a:t>
+              <a:t>(анимация) Стоимость экскурсии</a:t>
             </a:r>
           </a:p>
           <a:p>
@@ -1754,46 +1462,7 @@
                 <a:ea typeface="+mn-ea"/>
                 <a:cs typeface="+mn-cs"/>
               </a:rPr>
-              <a:t>(анимация) </a:t>
-            </a:r>
-            <a:r>
-              <a:rPr lang="ru-RU" sz="1200" kern="1200" dirty="0" smtClean="0">
-                <a:solidFill>
-                  <a:schemeClr val="tx1"/>
-                </a:solidFill>
-                <a:effectLst/>
-                <a:latin typeface="+mn-lt"/>
-                <a:ea typeface="+mn-ea"/>
-                <a:cs typeface="+mn-cs"/>
-              </a:rPr>
-              <a:t>Стоимость экскурсии</a:t>
-            </a:r>
-          </a:p>
-          <a:p>
-            <a:pPr lvl="0"/>
-            <a:r>
-              <a:rPr lang="ru-RU" sz="1200" kern="1200" dirty="0" smtClean="0">
-                <a:solidFill>
-                  <a:schemeClr val="tx1"/>
-                </a:solidFill>
-                <a:effectLst/>
-                <a:latin typeface="+mn-lt"/>
-                <a:ea typeface="+mn-ea"/>
-                <a:cs typeface="+mn-cs"/>
-              </a:rPr>
-              <a:t>(анимация) </a:t>
-            </a:r>
-            <a:r>
-              <a:rPr lang="ru-RU" sz="1200" kern="1200" dirty="0" smtClean="0">
-                <a:solidFill>
-                  <a:schemeClr val="tx1"/>
-                </a:solidFill>
-                <a:effectLst/>
-                <a:latin typeface="+mn-lt"/>
-                <a:ea typeface="+mn-ea"/>
-                <a:cs typeface="+mn-cs"/>
-              </a:rPr>
-              <a:t>Телефон экскурсовода</a:t>
+              <a:t>(анимация) Телефон экскурсовода</a:t>
             </a:r>
           </a:p>
           <a:p>
@@ -1904,19 +1573,7 @@
                 <a:ea typeface="+mn-ea"/>
                 <a:cs typeface="+mn-cs"/>
               </a:rPr>
-              <a:t>(анимация) </a:t>
-            </a:r>
-            <a:r>
-              <a:rPr lang="ru-RU" sz="1200" kern="1200" dirty="0" smtClean="0">
-                <a:solidFill>
-                  <a:schemeClr val="tx1"/>
-                </a:solidFill>
-                <a:effectLst/>
-                <a:latin typeface="+mn-lt"/>
-                <a:ea typeface="+mn-ea"/>
-                <a:cs typeface="+mn-cs"/>
-              </a:rPr>
-              <a:t>Библиотека </a:t>
+              <a:t>(анимация) Библиотека </a:t>
             </a:r>
             <a:r>
               <a:rPr lang="en-US" sz="1200" kern="1200" dirty="0" smtClean="0">
@@ -2126,19 +1783,7 @@
                 <a:ea typeface="+mn-ea"/>
                 <a:cs typeface="+mn-cs"/>
               </a:rPr>
-              <a:t>(анимация) </a:t>
-            </a:r>
-            <a:r>
-              <a:rPr lang="ru-RU" sz="1200" kern="1200" dirty="0" smtClean="0">
-                <a:solidFill>
-                  <a:schemeClr val="tx1"/>
-                </a:solidFill>
-                <a:effectLst/>
-                <a:latin typeface="+mn-lt"/>
-                <a:ea typeface="+mn-ea"/>
-                <a:cs typeface="+mn-cs"/>
-              </a:rPr>
-              <a:t>Именованные сущности в запросах Алисы – для адресов, дат, времени и числовых сущностей</a:t>
+              <a:t>(анимация) Именованные сущности в запросах Алисы – для адресов, дат, времени и числовых сущностей</a:t>
             </a:r>
           </a:p>
           <a:p>
@@ -3231,7 +2876,19 @@
                 <a:ea typeface="+mn-ea"/>
                 <a:cs typeface="+mn-cs"/>
               </a:rPr>
-              <a:t>анимация) </a:t>
+              <a:t>анимация) поиска ближайших 5 экскурсий по введенному адресу. А</a:t>
+            </a:r>
+            <a:r>
+              <a:rPr lang="ru-RU" sz="1200" kern="1200" baseline="0" dirty="0" smtClean="0">
+                <a:solidFill>
+                  <a:schemeClr val="tx1"/>
+                </a:solidFill>
+                <a:effectLst/>
+                <a:latin typeface="+mn-lt"/>
+                <a:ea typeface="+mn-ea"/>
+                <a:cs typeface="+mn-cs"/>
+              </a:rPr>
+              <a:t> ч</a:t>
             </a:r>
             <a:r>
               <a:rPr lang="ru-RU" sz="1200" kern="1200" dirty="0" smtClean="0">
@@ -3243,19 +2900,19 @@
                 <a:ea typeface="+mn-ea"/>
                 <a:cs typeface="+mn-cs"/>
               </a:rPr>
-              <a:t>поиска ближайших 5 экскурсий по введенному адресу. А</a:t>
-            </a:r>
-            <a:r>
-              <a:rPr lang="ru-RU" sz="1200" kern="1200" baseline="0" dirty="0" smtClean="0">
-                <a:solidFill>
-                  <a:schemeClr val="tx1"/>
-                </a:solidFill>
-                <a:effectLst/>
-                <a:latin typeface="+mn-lt"/>
-                <a:ea typeface="+mn-ea"/>
-                <a:cs typeface="+mn-cs"/>
-              </a:rPr>
-              <a:t> ч</a:t>
+              <a:t>тобы было проще найти подходящую экскурсию, можно добавить </a:t>
+            </a:r>
+            <a:r>
+              <a:rPr lang="en-US" sz="1200" kern="1200" dirty="0" smtClean="0">
+                <a:solidFill>
+                  <a:schemeClr val="tx1"/>
+                </a:solidFill>
+                <a:effectLst/>
+                <a:latin typeface="+mn-lt"/>
+                <a:ea typeface="+mn-ea"/>
+                <a:cs typeface="+mn-cs"/>
+              </a:rPr>
+              <a:t>(</a:t>
             </a:r>
             <a:r>
               <a:rPr lang="ru-RU" sz="1200" kern="1200" dirty="0" smtClean="0">
@@ -3267,7 +2924,7 @@
                 <a:ea typeface="+mn-ea"/>
                 <a:cs typeface="+mn-cs"/>
               </a:rPr>
-              <a:t>тобы было проще найти подходящую экскурсию, можно добавить </a:t>
+              <a:t>анимация) поиск экскурсий в городе по ключевым словам. Например, если экскурсии в Москве, то запрос мог выглядеть так «Красная площадь, нулевой километр, Собор Василия Блаженного». И в зависимости от количества совпадений ключевых слов с описанием экскурсии, выводился бы рейтинг экскурсий по этим словам. Чтобы экскурсоводу было проще определить, сколько человек будет на экскурсии, можно добавить </a:t>
             </a:r>
             <a:r>
               <a:rPr lang="en-US" sz="1200" kern="1200" dirty="0" smtClean="0">
@@ -3291,55 +2948,7 @@
                 <a:ea typeface="+mn-ea"/>
                 <a:cs typeface="+mn-cs"/>
               </a:rPr>
-              <a:t>анимация) </a:t>
-            </a:r>
-            <a:r>
-              <a:rPr lang="ru-RU" sz="1200" kern="1200" dirty="0" smtClean="0">
-                <a:solidFill>
-                  <a:schemeClr val="tx1"/>
-                </a:solidFill>
-                <a:effectLst/>
-                <a:latin typeface="+mn-lt"/>
-                <a:ea typeface="+mn-ea"/>
-                <a:cs typeface="+mn-cs"/>
-              </a:rPr>
-              <a:t>поиск экскурсий в городе по ключевым словам. Например, если экскурсии в Москве, то запрос мог выглядеть так «Красная площадь, нулевой километр, Собор Василия Блаженного». И в зависимости от количества совпадений ключевых слов с описанием экскурсии, выводился бы рейтинг экскурсий по этим словам. Чтобы экскурсоводу было проще определить, сколько человек будет на экскурсии, можно добавить </a:t>
-            </a:r>
-            <a:r>
-              <a:rPr lang="en-US" sz="1200" kern="1200" dirty="0" smtClean="0">
-                <a:solidFill>
-                  <a:schemeClr val="tx1"/>
-                </a:solidFill>
-                <a:effectLst/>
-                <a:latin typeface="+mn-lt"/>
-                <a:ea typeface="+mn-ea"/>
-                <a:cs typeface="+mn-cs"/>
-              </a:rPr>
-              <a:t>(</a:t>
-            </a:r>
-            <a:r>
-              <a:rPr lang="ru-RU" sz="1200" kern="1200" dirty="0" smtClean="0">
-                <a:solidFill>
-                  <a:schemeClr val="tx1"/>
-                </a:solidFill>
-                <a:effectLst/>
-                <a:latin typeface="+mn-lt"/>
-                <a:ea typeface="+mn-ea"/>
-                <a:cs typeface="+mn-cs"/>
-              </a:rPr>
-              <a:t>анимация)</a:t>
-            </a:r>
-            <a:r>
-              <a:rPr lang="ru-RU" sz="1200" kern="1200" dirty="0" smtClean="0">
-                <a:solidFill>
-                  <a:schemeClr val="tx1"/>
-                </a:solidFill>
-                <a:effectLst/>
-                <a:latin typeface="+mn-lt"/>
-                <a:ea typeface="+mn-ea"/>
-                <a:cs typeface="+mn-cs"/>
-              </a:rPr>
-              <a:t> возможность записаться на экскурсию по электронной почте с подтверждением этой почты. А в описании экскурсии отображалось бы, сколько человек уже записались.</a:t>
+              <a:t>анимация) возможность записаться на экскурсию по электронной почте с подтверждением этой почты. А в описании экскурсии отображалось бы, сколько человек уже записались.</a:t>
             </a:r>
           </a:p>
           <a:p>
@@ -3598,7 +3207,7 @@
           <a:p>
             <a:fld id="{57ACE201-06C7-4F14-88C9-FBFB9E3406F5}" type="datetimeFigureOut">
               <a:rPr lang="ru-RU" smtClean="0"/>
-              <a:t>21.04.2019</a:t>
+              <a:t>07.05.2019</a:t>
             </a:fld>
             <a:endParaRPr lang="ru-RU"/>
           </a:p>
@@ -3768,7 +3377,7 @@
           <a:p>
             <a:fld id="{57ACE201-06C7-4F14-88C9-FBFB9E3406F5}" type="datetimeFigureOut">
               <a:rPr lang="ru-RU" smtClean="0"/>
-              <a:t>21.04.2019</a:t>
+              <a:t>07.05.2019</a:t>
             </a:fld>
             <a:endParaRPr lang="ru-RU"/>
           </a:p>
@@ -3948,7 +3557,7 @@
           <a:p>
             <a:fld id="{57ACE201-06C7-4F14-88C9-FBFB9E3406F5}" type="datetimeFigureOut">
               <a:rPr lang="ru-RU" smtClean="0"/>
-              <a:t>21.04.2019</a:t>
+              <a:t>07.05.2019</a:t>
             </a:fld>
             <a:endParaRPr lang="ru-RU"/>
           </a:p>
@@ -4118,7 +3727,7 @@
           <a:p>
             <a:fld id="{57ACE201-06C7-4F14-88C9-FBFB9E3406F5}" type="datetimeFigureOut">
               <a:rPr lang="ru-RU" smtClean="0"/>
-              <a:t>21.04.2019</a:t>
+              <a:t>07.05.2019</a:t>
             </a:fld>
             <a:endParaRPr lang="ru-RU"/>
           </a:p>
@@ -4364,7 +3973,7 @@
           <a:p>
             <a:fld id="{57ACE201-06C7-4F14-88C9-FBFB9E3406F5}" type="datetimeFigureOut">
               <a:rPr lang="ru-RU" smtClean="0"/>
-              <a:t>21.04.2019</a:t>
+              <a:t>07.05.2019</a:t>
             </a:fld>
             <a:endParaRPr lang="ru-RU"/>
           </a:p>
@@ -4596,7 +4205,7 @@
           <a:p>
             <a:fld id="{57ACE201-06C7-4F14-88C9-FBFB9E3406F5}" type="datetimeFigureOut">
               <a:rPr lang="ru-RU" smtClean="0"/>
-              <a:t>21.04.2019</a:t>
+              <a:t>07.05.2019</a:t>
             </a:fld>
             <a:endParaRPr lang="ru-RU"/>
           </a:p>
@@ -4963,7 +4572,7 @@
           <a:p>
             <a:fld id="{57ACE201-06C7-4F14-88C9-FBFB9E3406F5}" type="datetimeFigureOut">
               <a:rPr lang="ru-RU" smtClean="0"/>
-              <a:t>21.04.2019</a:t>
+              <a:t>07.05.2019</a:t>
             </a:fld>
             <a:endParaRPr lang="ru-RU"/>
           </a:p>
@@ -5081,7 +4690,7 @@
           <a:p>
             <a:fld id="{57ACE201-06C7-4F14-88C9-FBFB9E3406F5}" type="datetimeFigureOut">
               <a:rPr lang="ru-RU" smtClean="0"/>
-              <a:t>21.04.2019</a:t>
+              <a:t>07.05.2019</a:t>
             </a:fld>
             <a:endParaRPr lang="ru-RU"/>
           </a:p>
@@ -5176,7 +4785,7 @@
           <a:p>
             <a:fld id="{57ACE201-06C7-4F14-88C9-FBFB9E3406F5}" type="datetimeFigureOut">
               <a:rPr lang="ru-RU" smtClean="0"/>
-              <a:t>21.04.2019</a:t>
+              <a:t>07.05.2019</a:t>
             </a:fld>
             <a:endParaRPr lang="ru-RU"/>
           </a:p>
@@ -5453,7 +5062,7 @@
           <a:p>
             <a:fld id="{57ACE201-06C7-4F14-88C9-FBFB9E3406F5}" type="datetimeFigureOut">
               <a:rPr lang="ru-RU" smtClean="0"/>
-              <a:t>21.04.2019</a:t>
+              <a:t>07.05.2019</a:t>
             </a:fld>
             <a:endParaRPr lang="ru-RU"/>
           </a:p>
@@ -5706,7 +5315,7 @@
           <a:p>
             <a:fld id="{57ACE201-06C7-4F14-88C9-FBFB9E3406F5}" type="datetimeFigureOut">
               <a:rPr lang="ru-RU" smtClean="0"/>
-              <a:t>21.04.2019</a:t>
+              <a:t>07.05.2019</a:t>
             </a:fld>
             <a:endParaRPr lang="ru-RU"/>
           </a:p>
@@ -5919,7 +5528,7 @@
           <a:p>
             <a:fld id="{57ACE201-06C7-4F14-88C9-FBFB9E3406F5}" type="datetimeFigureOut">
               <a:rPr lang="ru-RU" smtClean="0"/>
-              <a:t>21.04.2019</a:t>
+              <a:t>07.05.2019</a:t>
             </a:fld>
             <a:endParaRPr lang="ru-RU"/>
           </a:p>
@@ -7236,7 +6845,7 @@
         <p:spPr>
           <a:xfrm>
             <a:off x="1124662" y="1033199"/>
-            <a:ext cx="9657637" cy="4862485"/>
+            <a:ext cx="9657637" cy="4879990"/>
           </a:xfrm>
           <a:prstGeom prst="rect">
             <a:avLst/>
@@ -7470,14 +7079,16 @@
                 <a:ea typeface="Calibri" panose="020F0502020204030204" pitchFamily="34" charset="0"/>
                 <a:cs typeface="Times New Roman" panose="02020603050405020304" pitchFamily="18" charset="0"/>
               </a:rPr>
-              <a:t>Описание места встречи, чтобы было удобнее его найти</a:t>
-            </a:r>
-            <a:endParaRPr lang="ru-RU" sz="2400" dirty="0" smtClean="0">
-              <a:effectLst/>
-              <a:latin typeface="Calibri" panose="020F0502020204030204" pitchFamily="34" charset="0"/>
-              <a:ea typeface="Calibri" panose="020F0502020204030204" pitchFamily="34" charset="0"/>
-              <a:cs typeface="Times New Roman" panose="02020603050405020304" pitchFamily="18" charset="0"/>
-            </a:endParaRPr>
+              <a:t>Описание места </a:t>
+            </a:r>
+            <a:r>
+              <a:rPr lang="ru-RU" sz="2400" dirty="0" smtClean="0">
+                <a:latin typeface="Calibri" panose="020F0502020204030204" pitchFamily="34" charset="0"/>
+                <a:ea typeface="Calibri" panose="020F0502020204030204" pitchFamily="34" charset="0"/>
+                <a:cs typeface="Times New Roman" panose="02020603050405020304" pitchFamily="18" charset="0"/>
+              </a:rPr>
+              <a:t>встречи</a:t>
+            </a:r>
           </a:p>
           <a:p>
             <a:pPr marL="342900" lvl="0" indent="-342900">
@@ -7488,18 +7099,26 @@
                 <a:spcPts val="1200"/>
               </a:spcBef>
               <a:spcAft>
-                <a:spcPts val="800"/>
+                <a:spcPts val="0"/>
               </a:spcAft>
               <a:buFont typeface="Arial" panose="020B0604020202020204" pitchFamily="34" charset="0"/>
               <a:buChar char="•"/>
             </a:pPr>
             <a:r>
+              <a:rPr lang="ru-RU" sz="2400" dirty="0" smtClean="0">
+                <a:latin typeface="Calibri" panose="020F0502020204030204" pitchFamily="34" charset="0"/>
+                <a:ea typeface="Calibri" panose="020F0502020204030204" pitchFamily="34" charset="0"/>
+                <a:cs typeface="Times New Roman" panose="02020603050405020304" pitchFamily="18" charset="0"/>
+              </a:rPr>
+              <a:t>Телефон </a:t>
+            </a:r>
+            <a:r>
               <a:rPr lang="ru-RU" sz="2400" dirty="0">
                 <a:latin typeface="Calibri" panose="020F0502020204030204" pitchFamily="34" charset="0"/>
                 <a:ea typeface="Calibri" panose="020F0502020204030204" pitchFamily="34" charset="0"/>
                 <a:cs typeface="Times New Roman" panose="02020603050405020304" pitchFamily="18" charset="0"/>
               </a:rPr>
-              <a:t>Телефон экскурсовода</a:t>
+              <a:t>экскурсовода</a:t>
             </a:r>
             <a:endParaRPr lang="ru-RU" sz="2400" dirty="0">
               <a:effectLst/>
@@ -8142,7 +7761,7 @@
         <p:spPr>
           <a:xfrm>
             <a:off x="4394200" y="1041636"/>
-            <a:ext cx="6096000" cy="5257658"/>
+            <a:ext cx="6096000" cy="4879990"/>
           </a:xfrm>
           <a:prstGeom prst="rect">
             <a:avLst/>
@@ -8318,14 +7937,8 @@
                 <a:ea typeface="Calibri" panose="020F0502020204030204" pitchFamily="34" charset="0"/>
                 <a:cs typeface="Times New Roman" panose="02020603050405020304" pitchFamily="18" charset="0"/>
               </a:rPr>
-              <a:t>Описание экскурсии – какие места будут посещены и т.п.</a:t>
-            </a:r>
-            <a:endParaRPr lang="ru-RU" sz="2400" dirty="0" smtClean="0">
-              <a:effectLst/>
-              <a:latin typeface="Calibri" panose="020F0502020204030204" pitchFamily="34" charset="0"/>
-              <a:ea typeface="Calibri" panose="020F0502020204030204" pitchFamily="34" charset="0"/>
-              <a:cs typeface="Times New Roman" panose="02020603050405020304" pitchFamily="18" charset="0"/>
-            </a:endParaRPr>
+              <a:t>Описание экскурсии </a:t>
+            </a:r>
           </a:p>
           <a:p>
             <a:pPr marL="342900" lvl="0" indent="-342900">

</xml_diff>